<commit_message>
Updated open issues on slides
</commit_message>
<xml_diff>
--- a/presentations/slides-116-anima-update-brski-with-pledge-in-responder-mode-brski-prm.pptx
+++ b/presentations/slides-116-anima-update-brski-with-pledge-in-responder-mode-brski-prm.pptx
@@ -237,7 +237,7 @@
           <a:p>
             <a:fld id="{33B5B5E8-CA78-4A82-83A0-867EF5A818AE}" type="datetimeFigureOut">
               <a:rPr lang="en-US" smtClean="0"/>
-              <a:t>3/23/2023</a:t>
+              <a:t>3/24/2023</a:t>
             </a:fld>
             <a:endParaRPr lang="en-US"/>
           </a:p>
@@ -1163,7 +1163,7 @@
           <a:p>
             <a:fld id="{8C792E63-5F21-4F54-A864-D84D9F273FCA}" type="datetimeFigureOut">
               <a:rPr lang="en-US" smtClean="0"/>
-              <a:t>3/23/2023</a:t>
+              <a:t>3/24/2023</a:t>
             </a:fld>
             <a:endParaRPr lang="en-US" dirty="0"/>
           </a:p>
@@ -1381,7 +1381,7 @@
           <a:p>
             <a:fld id="{8C792E63-5F21-4F54-A864-D84D9F273FCA}" type="datetimeFigureOut">
               <a:rPr lang="en-US" smtClean="0"/>
-              <a:t>3/23/2023</a:t>
+              <a:t>3/24/2023</a:t>
             </a:fld>
             <a:endParaRPr lang="en-US"/>
           </a:p>
@@ -1605,7 +1605,7 @@
           <a:p>
             <a:fld id="{8C792E63-5F21-4F54-A864-D84D9F273FCA}" type="datetimeFigureOut">
               <a:rPr lang="en-US" smtClean="0"/>
-              <a:t>3/23/2023</a:t>
+              <a:t>3/24/2023</a:t>
             </a:fld>
             <a:endParaRPr lang="en-US"/>
           </a:p>
@@ -1819,7 +1819,7 @@
           <a:p>
             <a:fld id="{8C792E63-5F21-4F54-A864-D84D9F273FCA}" type="datetimeFigureOut">
               <a:rPr lang="en-US" smtClean="0"/>
-              <a:t>3/23/2023</a:t>
+              <a:t>3/24/2023</a:t>
             </a:fld>
             <a:endParaRPr lang="en-US"/>
           </a:p>
@@ -2110,7 +2110,7 @@
           <a:p>
             <a:fld id="{8C792E63-5F21-4F54-A864-D84D9F273FCA}" type="datetimeFigureOut">
               <a:rPr lang="en-US" smtClean="0"/>
-              <a:t>3/23/2023</a:t>
+              <a:t>3/24/2023</a:t>
             </a:fld>
             <a:endParaRPr lang="en-US"/>
           </a:p>
@@ -2391,7 +2391,7 @@
           <a:p>
             <a:fld id="{8C792E63-5F21-4F54-A864-D84D9F273FCA}" type="datetimeFigureOut">
               <a:rPr lang="en-US" smtClean="0"/>
-              <a:t>3/23/2023</a:t>
+              <a:t>3/24/2023</a:t>
             </a:fld>
             <a:endParaRPr lang="en-US"/>
           </a:p>
@@ -2819,7 +2819,7 @@
           <a:p>
             <a:fld id="{8C792E63-5F21-4F54-A864-D84D9F273FCA}" type="datetimeFigureOut">
               <a:rPr lang="en-US" smtClean="0"/>
-              <a:t>3/23/2023</a:t>
+              <a:t>3/24/2023</a:t>
             </a:fld>
             <a:endParaRPr lang="en-US"/>
           </a:p>
@@ -2976,7 +2976,7 @@
           <a:p>
             <a:fld id="{8C792E63-5F21-4F54-A864-D84D9F273FCA}" type="datetimeFigureOut">
               <a:rPr lang="en-US" smtClean="0"/>
-              <a:t>3/23/2023</a:t>
+              <a:t>3/24/2023</a:t>
             </a:fld>
             <a:endParaRPr lang="en-US"/>
           </a:p>
@@ -3105,7 +3105,7 @@
           <a:p>
             <a:fld id="{8C792E63-5F21-4F54-A864-D84D9F273FCA}" type="datetimeFigureOut">
               <a:rPr lang="en-US" smtClean="0"/>
-              <a:t>3/23/2023</a:t>
+              <a:t>3/24/2023</a:t>
             </a:fld>
             <a:endParaRPr lang="en-US"/>
           </a:p>
@@ -3432,7 +3432,7 @@
           <a:p>
             <a:fld id="{8C792E63-5F21-4F54-A864-D84D9F273FCA}" type="datetimeFigureOut">
               <a:rPr lang="en-US" smtClean="0"/>
-              <a:t>3/23/2023</a:t>
+              <a:t>3/24/2023</a:t>
             </a:fld>
             <a:endParaRPr lang="en-US"/>
           </a:p>
@@ -3736,7 +3736,7 @@
           <a:p>
             <a:fld id="{8C792E63-5F21-4F54-A864-D84D9F273FCA}" type="datetimeFigureOut">
               <a:rPr lang="en-US" smtClean="0"/>
-              <a:t>3/23/2023</a:t>
+              <a:t>3/24/2023</a:t>
             </a:fld>
             <a:endParaRPr lang="en-US"/>
           </a:p>
@@ -4028,7 +4028,7 @@
           <a:p>
             <a:fld id="{8C792E63-5F21-4F54-A864-D84D9F273FCA}" type="datetimeFigureOut">
               <a:rPr lang="en-US" smtClean="0"/>
-              <a:t>3/23/2023</a:t>
+              <a:t>3/24/2023</a:t>
             </a:fld>
             <a:endParaRPr lang="en-US"/>
           </a:p>
@@ -4900,7 +4900,7 @@
             <a:fld id="{8C792E63-5F21-4F54-A864-D84D9F273FCA}" type="datetimeFigureOut">
               <a:rPr lang="en-US" smtClean="0"/>
               <a:pPr/>
-              <a:t>3/23/2023</a:t>
+              <a:t>3/24/2023</a:t>
             </a:fld>
             <a:endParaRPr lang="en-US" dirty="0"/>
           </a:p>
@@ -5322,7 +5322,7 @@
             <a:fld id="{8C792E63-5F21-4F54-A864-D84D9F273FCA}" type="datetimeFigureOut">
               <a:rPr lang="en-US" smtClean="0"/>
               <a:pPr/>
-              <a:t>3/23/2023</a:t>
+              <a:t>3/24/2023</a:t>
             </a:fld>
             <a:endParaRPr lang="en-US" dirty="0"/>
           </a:p>
@@ -5515,14 +5515,14 @@
           <a:p>
             <a:r>
               <a:rPr lang="en-US" sz="3600" dirty="0"/>
-              <a:t>BRSKI-PRM Open</a:t>
+              <a:t>BRSKI-PRM </a:t>
             </a:r>
             <a:br>
               <a:rPr lang="en-US" sz="3600" dirty="0"/>
             </a:br>
             <a:r>
               <a:rPr lang="en-US" sz="3600" dirty="0"/>
-              <a:t>Issues collected after WGLC</a:t>
+              <a:t>Open Issues collected after WGLC</a:t>
             </a:r>
           </a:p>
         </p:txBody>
@@ -5565,7 +5565,7 @@
             </a:pPr>
             <a:r>
               <a:rPr lang="en-US" sz="2400" dirty="0"/>
-              <a:t>#79 discovery of registrar with BRSKI-PRM function set</a:t>
+              <a:t>Discovery related issues</a:t>
             </a:r>
           </a:p>
           <a:p>
@@ -5579,21 +5579,7 @@
             </a:pPr>
             <a:r>
               <a:rPr lang="en-US" sz="2000" dirty="0"/>
-              <a:t>DNS-SD with subtypes or text parameters to distinguish different function sets</a:t>
-            </a:r>
-          </a:p>
-          <a:p>
-            <a:pPr>
-              <a:lnSpc>
-                <a:spcPct val="100000"/>
-              </a:lnSpc>
-              <a:buSzPct val="80000"/>
-              <a:buFont typeface="Calibri" panose="020F0502020204030204" pitchFamily="34" charset="0"/>
-              <a:buChar char="–"/>
-            </a:pPr>
-            <a:r>
-              <a:rPr lang="en-US" sz="2400" dirty="0"/>
-              <a:t>#80 pledge discovery using GRASP? </a:t>
+              <a:t>#79 discovery of registrar with BRSKI-PRM function set (DNS-SD subtypes vs. text parameters)</a:t>
             </a:r>
           </a:p>
           <a:p>
@@ -5607,77 +5593,17 @@
             </a:pPr>
             <a:r>
               <a:rPr lang="en-US" sz="2000" dirty="0"/>
-              <a:t>Mention as alternative but ot-of-scope for the draft</a:t>
-            </a:r>
-          </a:p>
-          <a:p>
-            <a:pPr>
-              <a:lnSpc>
-                <a:spcPct val="100000"/>
-              </a:lnSpc>
-              <a:buSzPct val="80000"/>
-              <a:buFont typeface="Calibri" panose="020F0502020204030204" pitchFamily="34" charset="0"/>
-              <a:buChar char="–"/>
-            </a:pPr>
-            <a:r>
-              <a:rPr lang="en-US" sz="2400" dirty="0"/>
-              <a:t>#81 Additional text to explain usage of agent-signed data</a:t>
-            </a:r>
-          </a:p>
-          <a:p>
-            <a:pPr lvl="1">
-              <a:lnSpc>
-                <a:spcPct val="100000"/>
-              </a:lnSpc>
-              <a:buSzPct val="80000"/>
-              <a:buFont typeface="Calibri" panose="020F0502020204030204" pitchFamily="34" charset="0"/>
-              <a:buChar char="–"/>
-            </a:pPr>
+              <a:t>#80 pledge discovery using GRASP? </a:t>
+            </a:r>
+            <a:r>
+              <a:rPr lang="en-US" sz="2000" dirty="0">
+                <a:sym typeface="Wingdings" panose="05000000000000000000" pitchFamily="2" charset="2"/>
+              </a:rPr>
+              <a:t> </a:t>
+            </a:r>
             <a:r>
               <a:rPr lang="en-US" sz="2000" dirty="0"/>
-              <a:t>Text prepared for section 5.4 and for the introduction </a:t>
-            </a:r>
-          </a:p>
-          <a:p>
-            <a:pPr>
-              <a:lnSpc>
-                <a:spcPct val="100000"/>
-              </a:lnSpc>
-              <a:buSzPct val="80000"/>
-              <a:buFont typeface="Calibri" panose="020F0502020204030204" pitchFamily="34" charset="0"/>
-              <a:buChar char="–"/>
-            </a:pPr>
-            <a:r>
-              <a:rPr lang="en-US" sz="2400" dirty="0"/>
-              <a:t>#82 Include text related to TLS library issues</a:t>
-            </a:r>
-          </a:p>
-          <a:p>
-            <a:pPr lvl="1">
-              <a:lnSpc>
-                <a:spcPct val="100000"/>
-              </a:lnSpc>
-              <a:buSzPct val="80000"/>
-              <a:buFont typeface="Calibri" panose="020F0502020204030204" pitchFamily="34" charset="0"/>
-              <a:buChar char="–"/>
-            </a:pPr>
-            <a:r>
-              <a:rPr lang="en-US" sz="2000" dirty="0"/>
-              <a:t>Background: pledge cannot use IDevID as TLS server certificate as registrar-agent can't verify</a:t>
-            </a:r>
-          </a:p>
-          <a:p>
-            <a:pPr lvl="1">
-              <a:lnSpc>
-                <a:spcPct val="100000"/>
-              </a:lnSpc>
-              <a:buSzPct val="80000"/>
-              <a:buFont typeface="Calibri" panose="020F0502020204030204" pitchFamily="34" charset="0"/>
-              <a:buChar char="–"/>
-            </a:pPr>
-            <a:r>
-              <a:rPr lang="en-US" sz="2000" dirty="0"/>
-              <a:t>Proposal: not to be addressed in the draft</a:t>
+              <a:t>Alternative to be stated but ot-of-scope for the draft</a:t>
             </a:r>
           </a:p>
           <a:p>
@@ -5690,6 +5616,111 @@
               <a:buChar char="–"/>
             </a:pPr>
             <a:endParaRPr lang="en-US" sz="2400" dirty="0"/>
+          </a:p>
+          <a:p>
+            <a:pPr>
+              <a:lnSpc>
+                <a:spcPct val="100000"/>
+              </a:lnSpc>
+              <a:buSzPct val="80000"/>
+              <a:buFont typeface="Calibri" panose="020F0502020204030204" pitchFamily="34" charset="0"/>
+              <a:buChar char="–"/>
+            </a:pPr>
+            <a:r>
+              <a:rPr lang="en-US" sz="2400" dirty="0"/>
+              <a:t>Interaction Pledge and Registrar-agent (and Infrastructure)</a:t>
+            </a:r>
+          </a:p>
+          <a:p>
+            <a:pPr lvl="1">
+              <a:lnSpc>
+                <a:spcPct val="100000"/>
+              </a:lnSpc>
+              <a:buSzPct val="80000"/>
+              <a:buFont typeface="Calibri" panose="020F0502020204030204" pitchFamily="34" charset="0"/>
+              <a:buChar char="–"/>
+            </a:pPr>
+            <a:r>
+              <a:rPr lang="en-US" sz="2000" dirty="0"/>
+              <a:t>#81 Additional text to motivate and explain usage of agent-signed data</a:t>
+            </a:r>
+          </a:p>
+          <a:p>
+            <a:pPr lvl="1">
+              <a:lnSpc>
+                <a:spcPct val="100000"/>
+              </a:lnSpc>
+              <a:buSzPct val="80000"/>
+              <a:buFont typeface="Calibri" panose="020F0502020204030204" pitchFamily="34" charset="0"/>
+              <a:buChar char="–"/>
+            </a:pPr>
+            <a:r>
+              <a:rPr lang="en-US" sz="2000" dirty="0"/>
+              <a:t>#82 Enhance text explaining that </a:t>
+            </a:r>
+            <a:r>
+              <a:rPr lang="en-US" sz="2000" dirty="0" err="1"/>
+              <a:t>IDevID</a:t>
+            </a:r>
+            <a:r>
+              <a:rPr lang="en-US" sz="2000" dirty="0"/>
+              <a:t> cannot be used as TLS server certificate</a:t>
+            </a:r>
+          </a:p>
+          <a:p>
+            <a:pPr lvl="1">
+              <a:lnSpc>
+                <a:spcPct val="100000"/>
+              </a:lnSpc>
+              <a:buSzPct val="80000"/>
+              <a:buFont typeface="Calibri" panose="020F0502020204030204" pitchFamily="34" charset="0"/>
+              <a:buChar char="–"/>
+            </a:pPr>
+            <a:r>
+              <a:rPr lang="en-US" sz="2000" dirty="0"/>
+              <a:t>#87 Available information on registrar-agent (serial number sufficient, avoid requirement for </a:t>
+            </a:r>
+            <a:r>
+              <a:rPr lang="en-US" sz="2000" dirty="0" err="1"/>
+              <a:t>IDevID</a:t>
+            </a:r>
+            <a:r>
+              <a:rPr lang="en-US" sz="2000" dirty="0"/>
+              <a:t> CA certificates)</a:t>
+            </a:r>
+          </a:p>
+          <a:p>
+            <a:pPr lvl="1">
+              <a:lnSpc>
+                <a:spcPct val="100000"/>
+              </a:lnSpc>
+              <a:buSzPct val="80000"/>
+              <a:buFont typeface="Calibri" panose="020F0502020204030204" pitchFamily="34" charset="0"/>
+              <a:buChar char="–"/>
+            </a:pPr>
+            <a:r>
+              <a:rPr lang="en-US" sz="2000" dirty="0"/>
+              <a:t>#88 </a:t>
+            </a:r>
+            <a:r>
+              <a:rPr lang="en-US" sz="2000" dirty="0" err="1"/>
+              <a:t>IDevID</a:t>
+            </a:r>
+            <a:r>
+              <a:rPr lang="en-US" sz="2000" dirty="0"/>
+              <a:t> certificate chain in PVR (omitted to address constraint environments)</a:t>
+            </a:r>
+          </a:p>
+          <a:p>
+            <a:pPr lvl="1">
+              <a:lnSpc>
+                <a:spcPct val="100000"/>
+              </a:lnSpc>
+              <a:buSzPct val="80000"/>
+              <a:buFont typeface="Calibri" panose="020F0502020204030204" pitchFamily="34" charset="0"/>
+              <a:buChar char="–"/>
+            </a:pPr>
+            <a:endParaRPr lang="en-US" sz="2000" dirty="0"/>
           </a:p>
         </p:txBody>
       </p:sp>
@@ -5819,7 +5850,7 @@
             <a:fld id="{8C792E63-5F21-4F54-A864-D84D9F273FCA}" type="datetimeFigureOut">
               <a:rPr lang="en-US" smtClean="0"/>
               <a:pPr/>
-              <a:t>3/23/2023</a:t>
+              <a:t>3/24/2023</a:t>
             </a:fld>
             <a:endParaRPr lang="en-US" dirty="0"/>
           </a:p>
@@ -6043,7 +6074,7 @@
         <p:spPr>
           <a:xfrm>
             <a:off x="838199" y="1825625"/>
-            <a:ext cx="10695039" cy="4351338"/>
+            <a:ext cx="11032525" cy="4351338"/>
           </a:xfrm>
         </p:spPr>
         <p:txBody>
@@ -6062,7 +6093,7 @@
             </a:pPr>
             <a:r>
               <a:rPr lang="en-US" sz="2400" dirty="0"/>
-              <a:t>#83 Clarify re-enrollment support in BRSKI-PRM</a:t>
+              <a:t>Interaction Registrar-agent  and Registrar</a:t>
             </a:r>
           </a:p>
           <a:p>
@@ -6076,8 +6107,31 @@
             </a:pPr>
             <a:r>
               <a:rPr lang="en-US" sz="2000" dirty="0"/>
-              <a:t>BRSKI-PRM and BRSKI focus on bootstrapping and do not address re-enrollment</a:t>
-            </a:r>
+              <a:t>BRSKI-PRM assumes the registrar can distinguish </a:t>
+            </a:r>
+            <a:r>
+              <a:rPr lang="en-US" sz="2000" dirty="0" err="1"/>
+              <a:t>LDevID</a:t>
+            </a:r>
+            <a:r>
+              <a:rPr lang="en-US" sz="2000" dirty="0"/>
+              <a:t> (registrar-agent) vs. </a:t>
+            </a:r>
+            <a:r>
+              <a:rPr lang="en-US" sz="2000" dirty="0" err="1"/>
+              <a:t>IDevID</a:t>
+            </a:r>
+            <a:r>
+              <a:rPr lang="en-US" sz="2000" dirty="0"/>
+              <a:t> (pledge) also on existing endpoints</a:t>
+            </a:r>
+            <a:r>
+              <a:rPr lang="en-US" sz="2000" dirty="0">
+                <a:sym typeface="Wingdings" panose="05000000000000000000" pitchFamily="2" charset="2"/>
+              </a:rPr>
+              <a:t> proposal to keep this handling</a:t>
+            </a:r>
+            <a:endParaRPr lang="en-US" sz="2000" dirty="0"/>
           </a:p>
           <a:p>
             <a:pPr lvl="1">
@@ -6090,7 +6144,63 @@
             </a:pPr>
             <a:r>
               <a:rPr lang="en-US" sz="2000" dirty="0"/>
-              <a:t>Text to be added to motivate use of existing endpoints for re-enrollment </a:t>
+              <a:t>#84 use of registrar endpoints for responder vs. initiator mode</a:t>
+            </a:r>
+          </a:p>
+          <a:p>
+            <a:pPr lvl="1">
+              <a:lnSpc>
+                <a:spcPct val="100000"/>
+              </a:lnSpc>
+              <a:buSzPct val="80000"/>
+              <a:buFont typeface="Calibri" panose="020F0502020204030204" pitchFamily="34" charset="0"/>
+              <a:buChar char="–"/>
+            </a:pPr>
+            <a:r>
+              <a:rPr lang="en-US" sz="2000" dirty="0"/>
+              <a:t>#86 pledge/registrar recognition based on credential</a:t>
+            </a:r>
+          </a:p>
+          <a:p>
+            <a:pPr lvl="1">
+              <a:lnSpc>
+                <a:spcPct val="100000"/>
+              </a:lnSpc>
+              <a:buSzPct val="80000"/>
+              <a:buFont typeface="Calibri" panose="020F0502020204030204" pitchFamily="34" charset="0"/>
+              <a:buChar char="–"/>
+            </a:pPr>
+            <a:r>
+              <a:rPr lang="en-US" sz="2000" dirty="0"/>
+              <a:t>#91 PER processing (refer to handling as in BRSKI to sent PVR and PER over the same connection)</a:t>
+            </a:r>
+          </a:p>
+          <a:p>
+            <a:pPr lvl="1">
+              <a:lnSpc>
+                <a:spcPct val="100000"/>
+              </a:lnSpc>
+              <a:buSzPct val="80000"/>
+              <a:buFont typeface="Calibri" panose="020F0502020204030204" pitchFamily="34" charset="0"/>
+              <a:buChar char="–"/>
+            </a:pPr>
+            <a:r>
+              <a:rPr lang="en-US" sz="2000" dirty="0"/>
+              <a:t>#83 Clarify re-enrollment support in BRSKI-PRM (current focus initial enrollment)</a:t>
+            </a:r>
+          </a:p>
+          <a:p>
+            <a:pPr lvl="1">
+              <a:lnSpc>
+                <a:spcPct val="100000"/>
+              </a:lnSpc>
+              <a:buSzPct val="80000"/>
+              <a:buFont typeface="Calibri" panose="020F0502020204030204" pitchFamily="34" charset="0"/>
+              <a:buChar char="–"/>
+            </a:pPr>
+            <a:r>
+              <a:rPr lang="en-US" sz="2000" dirty="0"/>
+              <a:t>#92 Necessity for new registrar enrollment endpoint </a:t>
             </a:r>
           </a:p>
           <a:p>
@@ -6104,7 +6214,7 @@
             </a:pPr>
             <a:r>
               <a:rPr lang="en-US" sz="2400" dirty="0"/>
-              <a:t>#84 use of registrar endpoints for responder vs. initiator mode</a:t>
+              <a:t>Voucher Request and Voucher</a:t>
             </a:r>
           </a:p>
           <a:p>
@@ -6118,15 +6228,8 @@
             </a:pPr>
             <a:r>
               <a:rPr lang="en-US" sz="2000" dirty="0"/>
-              <a:t>BRSKI-PRM assumes the registrar can distinguish LDevID (registrar-agent) vs. IDevID (pledge) also on existing endpoints</a:t>
-            </a:r>
-            <a:r>
-              <a:rPr lang="en-US" sz="2000" dirty="0">
-                <a:sym typeface="Wingdings" panose="05000000000000000000" pitchFamily="2" charset="2"/>
-              </a:rPr>
-              <a:t> proposal to keep this handling</a:t>
-            </a:r>
-            <a:endParaRPr lang="en-US" sz="2000" dirty="0"/>
+              <a:t>#89 Naming: agent-proximity vs. agent-invited (or similar)</a:t>
+            </a:r>
           </a:p>
           <a:p>
             <a:pPr lvl="1">
@@ -6139,21 +6242,7 @@
             </a:pPr>
             <a:r>
               <a:rPr lang="en-US" sz="2000" dirty="0"/>
-              <a:t>PRM specific Media Type naming proposed to allow for using the same endpoint with different media types (instead of decision based on *DevID)</a:t>
-            </a:r>
-          </a:p>
-          <a:p>
-            <a:pPr>
-              <a:lnSpc>
-                <a:spcPct val="100000"/>
-              </a:lnSpc>
-              <a:buSzPct val="80000"/>
-              <a:buFont typeface="Calibri" panose="020F0502020204030204" pitchFamily="34" charset="0"/>
-              <a:buChar char="–"/>
-            </a:pPr>
-            <a:r>
-              <a:rPr lang="en-US" sz="2400" dirty="0"/>
-              <a:t>#86 pledge/registrar recognition based on credential</a:t>
+              <a:t>#90 Concept of second signature on voucher</a:t>
             </a:r>
           </a:p>
           <a:p>
@@ -6165,16 +6254,6 @@
               <a:buFont typeface="Calibri" panose="020F0502020204030204" pitchFamily="34" charset="0"/>
               <a:buChar char="–"/>
             </a:pPr>
-            <a:r>
-              <a:rPr lang="en-US" sz="2000" dirty="0"/>
-              <a:t>As in #84: BRSKI-PRM assumes the registrar can distinguish LDevID (registrar-agent) vs. IDevID (pledge) also on existing endpoints</a:t>
-            </a:r>
-            <a:r>
-              <a:rPr lang="en-US" sz="2000" dirty="0">
-                <a:sym typeface="Wingdings" panose="05000000000000000000" pitchFamily="2" charset="2"/>
-              </a:rPr>
-              <a:t> proposal to keep this handling</a:t>
-            </a:r>
             <a:endParaRPr lang="en-US" sz="2000" dirty="0"/>
           </a:p>
         </p:txBody>
@@ -6305,7 +6384,7 @@
             <a:fld id="{8C792E63-5F21-4F54-A864-D84D9F273FCA}" type="datetimeFigureOut">
               <a:rPr lang="en-US" smtClean="0"/>
               <a:pPr/>
-              <a:t>3/23/2023</a:t>
+              <a:t>3/24/2023</a:t>
             </a:fld>
             <a:endParaRPr lang="en-US" dirty="0"/>
           </a:p>
@@ -6760,7 +6839,7 @@
             <a:fld id="{8C792E63-5F21-4F54-A864-D84D9F273FCA}" type="datetimeFigureOut">
               <a:rPr lang="en-US" smtClean="0"/>
               <a:pPr/>
-              <a:t>3/23/2023</a:t>
+              <a:t>3/24/2023</a:t>
             </a:fld>
             <a:endParaRPr lang="en-US" dirty="0"/>
           </a:p>

</xml_diff>